<commit_message>
this is the most up to date power point
</commit_message>
<xml_diff>
--- a/Project1Pres.pptx
+++ b/Project1Pres.pptx
@@ -111,6 +111,11 @@
       </a:defRPr>
     </a:lvl9pPr>
   </p:defaultTextStyle>
+  <p:extLst>
+    <p:ext uri="{EFAFB233-063F-42B5-8137-9DF3F51BA10A}">
+      <p15:sldGuideLst xmlns:p15="http://schemas.microsoft.com/office/powerpoint/2012/main"/>
+    </p:ext>
+  </p:extLst>
 </p:presentation>
 </file>
 
@@ -836,7 +841,7 @@
           <a:p>
             <a:fld id="{20E37F9D-3E68-4C4E-89F5-CF704EA6413E}" type="datetimeFigureOut">
               <a:rPr lang="en-US" smtClean="0"/>
-              <a:t>4/6/23</a:t>
+              <a:t>4/10/23</a:t>
             </a:fld>
             <a:endParaRPr lang="en-US"/>
           </a:p>
@@ -1087,7 +1092,7 @@
           <a:p>
             <a:fld id="{20E37F9D-3E68-4C4E-89F5-CF704EA6413E}" type="datetimeFigureOut">
               <a:rPr lang="en-US" smtClean="0"/>
-              <a:t>4/6/23</a:t>
+              <a:t>4/10/23</a:t>
             </a:fld>
             <a:endParaRPr lang="en-US"/>
           </a:p>
@@ -1401,7 +1406,7 @@
           <a:p>
             <a:fld id="{20E37F9D-3E68-4C4E-89F5-CF704EA6413E}" type="datetimeFigureOut">
               <a:rPr lang="en-US" smtClean="0"/>
-              <a:t>4/6/23</a:t>
+              <a:t>4/10/23</a:t>
             </a:fld>
             <a:endParaRPr lang="en-US"/>
           </a:p>
@@ -1742,7 +1747,7 @@
           <a:p>
             <a:fld id="{20E37F9D-3E68-4C4E-89F5-CF704EA6413E}" type="datetimeFigureOut">
               <a:rPr lang="en-US" smtClean="0"/>
-              <a:t>4/6/23</a:t>
+              <a:t>4/10/23</a:t>
             </a:fld>
             <a:endParaRPr lang="en-US"/>
           </a:p>
@@ -2056,7 +2061,7 @@
           <a:p>
             <a:fld id="{20E37F9D-3E68-4C4E-89F5-CF704EA6413E}" type="datetimeFigureOut">
               <a:rPr lang="en-US" smtClean="0"/>
-              <a:t>4/6/23</a:t>
+              <a:t>4/10/23</a:t>
             </a:fld>
             <a:endParaRPr lang="en-US"/>
           </a:p>
@@ -2449,7 +2454,7 @@
           <a:p>
             <a:fld id="{20E37F9D-3E68-4C4E-89F5-CF704EA6413E}" type="datetimeFigureOut">
               <a:rPr lang="en-US" smtClean="0"/>
-              <a:t>4/6/23</a:t>
+              <a:t>4/10/23</a:t>
             </a:fld>
             <a:endParaRPr lang="en-US"/>
           </a:p>
@@ -2619,7 +2624,7 @@
           <a:p>
             <a:fld id="{20E37F9D-3E68-4C4E-89F5-CF704EA6413E}" type="datetimeFigureOut">
               <a:rPr lang="en-US" smtClean="0"/>
-              <a:t>4/6/23</a:t>
+              <a:t>4/10/23</a:t>
             </a:fld>
             <a:endParaRPr lang="en-US"/>
           </a:p>
@@ -2799,7 +2804,7 @@
           <a:p>
             <a:fld id="{20E37F9D-3E68-4C4E-89F5-CF704EA6413E}" type="datetimeFigureOut">
               <a:rPr lang="en-US" smtClean="0"/>
-              <a:t>4/6/23</a:t>
+              <a:t>4/10/23</a:t>
             </a:fld>
             <a:endParaRPr lang="en-US"/>
           </a:p>
@@ -2975,7 +2980,7 @@
           <a:p>
             <a:fld id="{20E37F9D-3E68-4C4E-89F5-CF704EA6413E}" type="datetimeFigureOut">
               <a:rPr lang="en-US" smtClean="0"/>
-              <a:t>4/6/23</a:t>
+              <a:t>4/10/23</a:t>
             </a:fld>
             <a:endParaRPr lang="en-US"/>
           </a:p>
@@ -3222,7 +3227,7 @@
           <a:p>
             <a:fld id="{20E37F9D-3E68-4C4E-89F5-CF704EA6413E}" type="datetimeFigureOut">
               <a:rPr lang="en-US" smtClean="0"/>
-              <a:t>4/6/23</a:t>
+              <a:t>4/10/23</a:t>
             </a:fld>
             <a:endParaRPr lang="en-US"/>
           </a:p>
@@ -3454,7 +3459,7 @@
           <a:p>
             <a:fld id="{20E37F9D-3E68-4C4E-89F5-CF704EA6413E}" type="datetimeFigureOut">
               <a:rPr lang="en-US" smtClean="0"/>
-              <a:t>4/6/23</a:t>
+              <a:t>4/10/23</a:t>
             </a:fld>
             <a:endParaRPr lang="en-US"/>
           </a:p>
@@ -3828,7 +3833,7 @@
           <a:p>
             <a:fld id="{20E37F9D-3E68-4C4E-89F5-CF704EA6413E}" type="datetimeFigureOut">
               <a:rPr lang="en-US" smtClean="0"/>
-              <a:t>4/6/23</a:t>
+              <a:t>4/10/23</a:t>
             </a:fld>
             <a:endParaRPr lang="en-US"/>
           </a:p>
@@ -3951,7 +3956,7 @@
           <a:p>
             <a:fld id="{20E37F9D-3E68-4C4E-89F5-CF704EA6413E}" type="datetimeFigureOut">
               <a:rPr lang="en-US" smtClean="0"/>
-              <a:t>4/6/23</a:t>
+              <a:t>4/10/23</a:t>
             </a:fld>
             <a:endParaRPr lang="en-US"/>
           </a:p>
@@ -4046,7 +4051,7 @@
           <a:p>
             <a:fld id="{20E37F9D-3E68-4C4E-89F5-CF704EA6413E}" type="datetimeFigureOut">
               <a:rPr lang="en-US" smtClean="0"/>
-              <a:t>4/6/23</a:t>
+              <a:t>4/10/23</a:t>
             </a:fld>
             <a:endParaRPr lang="en-US"/>
           </a:p>
@@ -4301,7 +4306,7 @@
           <a:p>
             <a:fld id="{20E37F9D-3E68-4C4E-89F5-CF704EA6413E}" type="datetimeFigureOut">
               <a:rPr lang="en-US" smtClean="0"/>
-              <a:t>4/6/23</a:t>
+              <a:t>4/10/23</a:t>
             </a:fld>
             <a:endParaRPr lang="en-US"/>
           </a:p>
@@ -4564,7 +4569,7 @@
           <a:p>
             <a:fld id="{20E37F9D-3E68-4C4E-89F5-CF704EA6413E}" type="datetimeFigureOut">
               <a:rPr lang="en-US" smtClean="0"/>
-              <a:t>4/6/23</a:t>
+              <a:t>4/10/23</a:t>
             </a:fld>
             <a:endParaRPr lang="en-US"/>
           </a:p>
@@ -5307,7 +5312,7 @@
           <a:p>
             <a:fld id="{20E37F9D-3E68-4C4E-89F5-CF704EA6413E}" type="datetimeFigureOut">
               <a:rPr lang="en-US" smtClean="0"/>
-              <a:t>4/6/23</a:t>
+              <a:t>4/10/23</a:t>
             </a:fld>
             <a:endParaRPr lang="en-US"/>
           </a:p>
@@ -8773,12 +8778,82 @@
           </a:extLst>
         </p:spPr>
       </p:pic>
+      <p:sp>
+        <p:nvSpPr>
+          <p:cNvPr id="4" name="TextBox 3">
+            <a:extLst>
+              <a:ext uri="{FF2B5EF4-FFF2-40B4-BE49-F238E27FC236}">
+                <a16:creationId xmlns:a16="http://schemas.microsoft.com/office/drawing/2014/main" id="{46AD74A1-3DDA-1127-13DA-CB5FE8BDA917}"/>
+              </a:ext>
+            </a:extLst>
+          </p:cNvPr>
+          <p:cNvSpPr txBox="1"/>
+          <p:nvPr/>
+        </p:nvSpPr>
+        <p:spPr>
+          <a:xfrm>
+            <a:off x="325820" y="4188622"/>
+            <a:ext cx="3779539" cy="369332"/>
+          </a:xfrm>
+          <a:prstGeom prst="rect">
+            <a:avLst/>
+          </a:prstGeom>
+          <a:noFill/>
+        </p:spPr>
+        <p:txBody>
+          <a:bodyPr wrap="square" rtlCol="0">
+            <a:spAutoFit/>
+          </a:bodyPr>
+          <a:lstStyle/>
+          <a:p>
+            <a:r>
+              <a:rPr lang="en-US" dirty="0"/>
+              <a:t>Social Support = 5.15x + 1.33</a:t>
+            </a:r>
+          </a:p>
+        </p:txBody>
+      </p:sp>
+      <p:sp>
+        <p:nvSpPr>
+          <p:cNvPr id="5" name="TextBox 4">
+            <a:extLst>
+              <a:ext uri="{FF2B5EF4-FFF2-40B4-BE49-F238E27FC236}">
+                <a16:creationId xmlns:a16="http://schemas.microsoft.com/office/drawing/2014/main" id="{F381B0B2-B820-8B19-CC78-F75115622AEB}"/>
+              </a:ext>
+            </a:extLst>
+          </p:cNvPr>
+          <p:cNvSpPr txBox="1"/>
+          <p:nvPr/>
+        </p:nvSpPr>
+        <p:spPr>
+          <a:xfrm>
+            <a:off x="4488325" y="4193996"/>
+            <a:ext cx="3779539" cy="369332"/>
+          </a:xfrm>
+          <a:prstGeom prst="rect">
+            <a:avLst/>
+          </a:prstGeom>
+          <a:noFill/>
+        </p:spPr>
+        <p:txBody>
+          <a:bodyPr wrap="square" rtlCol="0">
+            <a:spAutoFit/>
+          </a:bodyPr>
+          <a:lstStyle/>
+          <a:p>
+            <a:r>
+              <a:rPr lang="en-US" dirty="0"/>
+              <a:t>Happiness Level = 3.02x + 3.25</a:t>
+            </a:r>
+          </a:p>
+        </p:txBody>
+      </p:sp>
       <p:pic>
         <p:nvPicPr>
-          <p:cNvPr id="3076" name="Picture 4">
+          <p:cNvPr id="1026" name="Picture 2">
             <a:extLst>
               <a:ext uri="{FF2B5EF4-FFF2-40B4-BE49-F238E27FC236}">
-                <a16:creationId xmlns:a16="http://schemas.microsoft.com/office/drawing/2014/main" id="{2DAC25A0-02B1-F3A8-4FB7-577501378065}"/>
+                <a16:creationId xmlns:a16="http://schemas.microsoft.com/office/drawing/2014/main" id="{B8149315-B443-7BEB-1E86-A3D27FCEAB59}"/>
               </a:ext>
             </a:extLst>
           </p:cNvPr>
@@ -8795,14 +8870,15 @@
               </a:ext>
             </a:extLst>
           </a:blip>
+          <a:srcRect/>
           <a:stretch>
             <a:fillRect/>
           </a:stretch>
         </p:blipFill>
         <p:spPr bwMode="auto">
           <a:xfrm>
-            <a:off x="4391102" y="672935"/>
-            <a:ext cx="4882899" cy="3515687"/>
+            <a:off x="4470825" y="672935"/>
+            <a:ext cx="4897013" cy="3551274"/>
           </a:xfrm>
           <a:prstGeom prst="rect">
             <a:avLst/>
@@ -8819,76 +8895,6 @@
           </a:extLst>
         </p:spPr>
       </p:pic>
-      <p:sp>
-        <p:nvSpPr>
-          <p:cNvPr id="4" name="TextBox 3">
-            <a:extLst>
-              <a:ext uri="{FF2B5EF4-FFF2-40B4-BE49-F238E27FC236}">
-                <a16:creationId xmlns:a16="http://schemas.microsoft.com/office/drawing/2014/main" id="{46AD74A1-3DDA-1127-13DA-CB5FE8BDA917}"/>
-              </a:ext>
-            </a:extLst>
-          </p:cNvPr>
-          <p:cNvSpPr txBox="1"/>
-          <p:nvPr/>
-        </p:nvSpPr>
-        <p:spPr>
-          <a:xfrm>
-            <a:off x="325820" y="4188622"/>
-            <a:ext cx="3779539" cy="369332"/>
-          </a:xfrm>
-          <a:prstGeom prst="rect">
-            <a:avLst/>
-          </a:prstGeom>
-          <a:noFill/>
-        </p:spPr>
-        <p:txBody>
-          <a:bodyPr wrap="square" rtlCol="0">
-            <a:spAutoFit/>
-          </a:bodyPr>
-          <a:lstStyle/>
-          <a:p>
-            <a:r>
-              <a:rPr lang="en-US" dirty="0"/>
-              <a:t>Social Support = 5.15x + 1.33</a:t>
-            </a:r>
-          </a:p>
-        </p:txBody>
-      </p:sp>
-      <p:sp>
-        <p:nvSpPr>
-          <p:cNvPr id="5" name="TextBox 4">
-            <a:extLst>
-              <a:ext uri="{FF2B5EF4-FFF2-40B4-BE49-F238E27FC236}">
-                <a16:creationId xmlns:a16="http://schemas.microsoft.com/office/drawing/2014/main" id="{F381B0B2-B820-8B19-CC78-F75115622AEB}"/>
-              </a:ext>
-            </a:extLst>
-          </p:cNvPr>
-          <p:cNvSpPr txBox="1"/>
-          <p:nvPr/>
-        </p:nvSpPr>
-        <p:spPr>
-          <a:xfrm>
-            <a:off x="4471022" y="4146258"/>
-            <a:ext cx="3779539" cy="369332"/>
-          </a:xfrm>
-          <a:prstGeom prst="rect">
-            <a:avLst/>
-          </a:prstGeom>
-          <a:noFill/>
-        </p:spPr>
-        <p:txBody>
-          <a:bodyPr wrap="square" rtlCol="0">
-            <a:spAutoFit/>
-          </a:bodyPr>
-          <a:lstStyle/>
-          <a:p>
-            <a:r>
-              <a:rPr lang="en-US" dirty="0"/>
-              <a:t>Happiness Level = 3.02x + 3.25</a:t>
-            </a:r>
-          </a:p>
-        </p:txBody>
-      </p:sp>
     </p:spTree>
     <p:extLst>
       <p:ext uri="{BB962C8B-B14F-4D97-AF65-F5344CB8AC3E}">
@@ -9040,6 +9046,53 @@
           <a:xfrm>
             <a:off x="677334" y="2159331"/>
             <a:ext cx="5423429" cy="3882362"/>
+          </a:xfrm>
+          <a:prstGeom prst="rect">
+            <a:avLst/>
+          </a:prstGeom>
+          <a:noFill/>
+          <a:extLst>
+            <a:ext uri="{909E8E84-426E-40DD-AFC4-6F175D3DCCD1}">
+              <a14:hiddenFill xmlns:a14="http://schemas.microsoft.com/office/drawing/2010/main">
+                <a:solidFill>
+                  <a:srgbClr val="FFFFFF"/>
+                </a:solidFill>
+              </a14:hiddenFill>
+            </a:ext>
+          </a:extLst>
+        </p:spPr>
+      </p:pic>
+      <p:pic>
+        <p:nvPicPr>
+          <p:cNvPr id="2050" name="Picture 2">
+            <a:extLst>
+              <a:ext uri="{FF2B5EF4-FFF2-40B4-BE49-F238E27FC236}">
+                <a16:creationId xmlns:a16="http://schemas.microsoft.com/office/drawing/2014/main" id="{D123AD45-3C6F-22B1-A05A-07665934550C}"/>
+              </a:ext>
+            </a:extLst>
+          </p:cNvPr>
+          <p:cNvPicPr>
+            <a:picLocks noChangeAspect="1" noChangeArrowheads="1"/>
+          </p:cNvPicPr>
+          <p:nvPr/>
+        </p:nvPicPr>
+        <p:blipFill>
+          <a:blip r:embed="rId3">
+            <a:extLst>
+              <a:ext uri="{28A0092B-C50C-407E-A947-70E740481C1C}">
+                <a14:useLocalDpi xmlns:a14="http://schemas.microsoft.com/office/drawing/2010/main" val="0"/>
+              </a:ext>
+            </a:extLst>
+          </a:blip>
+          <a:srcRect/>
+          <a:stretch>
+            <a:fillRect/>
+          </a:stretch>
+        </p:blipFill>
+        <p:spPr bwMode="auto">
+          <a:xfrm>
+            <a:off x="1327150" y="0"/>
+            <a:ext cx="9537700" cy="6858000"/>
           </a:xfrm>
           <a:prstGeom prst="rect">
             <a:avLst/>

</xml_diff>